<commit_message>
pdf and video demo update
</commit_message>
<xml_diff>
--- a/docs/group4 Apr2 Presentation.pptx
+++ b/docs/group4 Apr2 Presentation.pptx
@@ -2951,7 +2951,7 @@
           <a:p>
             <a:fld id="{FADC07F7-0DB5-42DA-B94E-04F0A074878E}" type="datetimeFigureOut">
               <a:rPr lang="en-ID" smtClean="0"/>
-              <a:t>01/04/2022</a:t>
+              <a:t>02/04/2022</a:t>
             </a:fld>
             <a:endParaRPr lang="en-ID"/>
           </a:p>
@@ -3451,7 +3451,7 @@
           <a:p>
             <a:fld id="{073D55F9-11A3-4523-8F38-6BA37933791A}" type="datetime1">
               <a:rPr lang="en-US" smtClean="0"/>
-              <a:t>4/1/2022</a:t>
+              <a:t>4/2/2022</a:t>
             </a:fld>
             <a:endParaRPr lang="en-US"/>
           </a:p>
@@ -3653,7 +3653,7 @@
           <a:p>
             <a:fld id="{0B4E757A-3EC2-4683-9080-1A460C37C843}" type="datetime1">
               <a:rPr lang="en-US" smtClean="0"/>
-              <a:t>4/1/2022</a:t>
+              <a:t>4/2/2022</a:t>
             </a:fld>
             <a:endParaRPr lang="en-US"/>
           </a:p>
@@ -3869,7 +3869,7 @@
           <a:p>
             <a:fld id="{5CC8096C-64ED-4153-A483-5C02E44AD5C3}" type="datetime1">
               <a:rPr lang="en-US" smtClean="0"/>
-              <a:t>4/1/2022</a:t>
+              <a:t>4/2/2022</a:t>
             </a:fld>
             <a:endParaRPr lang="en-US" dirty="0"/>
           </a:p>
@@ -4102,7 +4102,7 @@
           <a:p>
             <a:fld id="{1CB9D56B-6EBE-4E5F-99D9-2A3DBDF37D0A}" type="datetime1">
               <a:rPr lang="en-US" smtClean="0"/>
-              <a:t>4/1/2022</a:t>
+              <a:t>4/2/2022</a:t>
             </a:fld>
             <a:endParaRPr lang="en-US"/>
           </a:p>
@@ -4379,7 +4379,7 @@
           <a:p>
             <a:fld id="{8C33F3CA-C7E3-432D-9282-18F13836509A}" type="datetime1">
               <a:rPr lang="en-US" smtClean="0"/>
-              <a:t>4/1/2022</a:t>
+              <a:t>4/2/2022</a:t>
             </a:fld>
             <a:endParaRPr lang="en-US" dirty="0"/>
           </a:p>
@@ -4649,7 +4649,7 @@
           <a:p>
             <a:fld id="{75BE9C62-1337-40B8-BA50-E9F4861DB4BC}" type="datetime1">
               <a:rPr lang="en-US" smtClean="0"/>
-              <a:t>4/1/2022</a:t>
+              <a:t>4/2/2022</a:t>
             </a:fld>
             <a:endParaRPr lang="en-US"/>
           </a:p>
@@ -5066,7 +5066,7 @@
           <a:p>
             <a:fld id="{47C195EB-2DA3-4B24-8725-19BC22A7BE50}" type="datetime1">
               <a:rPr lang="en-US" smtClean="0"/>
-              <a:t>4/1/2022</a:t>
+              <a:t>4/2/2022</a:t>
             </a:fld>
             <a:endParaRPr lang="en-US"/>
           </a:p>
@@ -5211,7 +5211,7 @@
           <a:p>
             <a:fld id="{F4E237E6-0076-4915-A5A8-B7C11FA4F374}" type="datetime1">
               <a:rPr lang="en-US" smtClean="0"/>
-              <a:t>4/1/2022</a:t>
+              <a:t>4/2/2022</a:t>
             </a:fld>
             <a:endParaRPr lang="en-US"/>
           </a:p>
@@ -5327,7 +5327,7 @@
           <a:p>
             <a:fld id="{3505F58F-C0B5-422A-8E5A-6B99E5D80F0A}" type="datetime1">
               <a:rPr lang="en-US" smtClean="0"/>
-              <a:t>4/1/2022</a:t>
+              <a:t>4/2/2022</a:t>
             </a:fld>
             <a:endParaRPr lang="en-US"/>
           </a:p>
@@ -5643,7 +5643,7 @@
           <a:p>
             <a:fld id="{7565E655-9687-48DF-A33F-F8824CCCB5D1}" type="datetime1">
               <a:rPr lang="en-US" smtClean="0"/>
-              <a:t>4/1/2022</a:t>
+              <a:t>4/2/2022</a:t>
             </a:fld>
             <a:endParaRPr lang="en-US"/>
           </a:p>
@@ -5939,7 +5939,7 @@
           <a:p>
             <a:fld id="{B97FD56A-AAB8-4544-A495-D0645413C9E3}" type="datetime1">
               <a:rPr lang="en-US" smtClean="0"/>
-              <a:t>4/1/2022</a:t>
+              <a:t>4/2/2022</a:t>
             </a:fld>
             <a:endParaRPr lang="en-US"/>
           </a:p>
@@ -7760,7 +7760,7 @@
             <a:fld id="{193BAB95-8DA7-460B-B00A-7037C8394FB0}" type="datetime1">
               <a:rPr lang="en-US" smtClean="0"/>
               <a:pPr/>
-              <a:t>4/1/2022</a:t>
+              <a:t>4/2/2022</a:t>
             </a:fld>
             <a:endParaRPr lang="en-US" dirty="0"/>
           </a:p>
@@ -16901,10 +16901,10 @@
       </p:pic>
       <p:pic>
         <p:nvPicPr>
-          <p:cNvPr id="11" name="Picture 10">
+          <p:cNvPr id="5" name="Picture 4">
             <a:extLst>
               <a:ext uri="{FF2B5EF4-FFF2-40B4-BE49-F238E27FC236}">
-                <a16:creationId xmlns:a16="http://schemas.microsoft.com/office/drawing/2014/main" id="{C3AB7BAE-CB01-4740-ABAC-C9A1BD857DD9}"/>
+                <a16:creationId xmlns:a16="http://schemas.microsoft.com/office/drawing/2014/main" id="{5230C56B-7877-45D7-A89D-39D70360A5AC}"/>
               </a:ext>
             </a:extLst>
           </p:cNvPr>
@@ -16921,8 +16921,8 @@
         </p:blipFill>
         <p:spPr>
           <a:xfrm>
-            <a:off x="6590998" y="3561815"/>
-            <a:ext cx="5402134" cy="2660550"/>
+            <a:off x="6598380" y="3789989"/>
+            <a:ext cx="5366701" cy="2656418"/>
           </a:xfrm>
           <a:prstGeom prst="rect">
             <a:avLst/>
@@ -28910,31 +28910,40 @@
           </a:p>
         </p:txBody>
       </p:sp>
-      <p:sp>
-        <p:nvSpPr>
-          <p:cNvPr id="3" name="Content Placeholder 2">
+      <p:pic>
+        <p:nvPicPr>
+          <p:cNvPr id="4" name="Online Media 3" title="demo video - weatherly">
+            <a:hlinkClick r:id="" action="ppaction://media"/>
             <a:extLst>
               <a:ext uri="{FF2B5EF4-FFF2-40B4-BE49-F238E27FC236}">
-                <a16:creationId xmlns:a16="http://schemas.microsoft.com/office/drawing/2014/main" id="{FBC6F45B-761F-493A-A0E3-A9DC061CE993}"/>
+                <a16:creationId xmlns:a16="http://schemas.microsoft.com/office/drawing/2014/main" id="{354FE182-224A-4AD9-840A-C85937135025}"/>
               </a:ext>
             </a:extLst>
           </p:cNvPr>
-          <p:cNvSpPr>
-            <a:spLocks noGrp="1"/>
-          </p:cNvSpPr>
+          <p:cNvPicPr>
+            <a:picLocks noGrp="1" noRot="1" noChangeAspect="1"/>
+          </p:cNvPicPr>
           <p:nvPr>
             <p:ph idx="1"/>
+            <a:videoFile r:link="rId1"/>
           </p:nvPr>
-        </p:nvSpPr>
-        <p:spPr/>
-        <p:txBody>
-          <a:bodyPr/>
-          <a:lstStyle/>
-          <a:p>
-            <a:endParaRPr lang="en-ID"/>
-          </a:p>
-        </p:txBody>
-      </p:sp>
+        </p:nvPicPr>
+        <p:blipFill>
+          <a:blip r:embed="rId3"/>
+          <a:stretch>
+            <a:fillRect/>
+          </a:stretch>
+        </p:blipFill>
+        <p:spPr>
+          <a:xfrm>
+            <a:off x="1261872" y="1527048"/>
+            <a:ext cx="9518904" cy="4649915"/>
+          </a:xfrm>
+          <a:prstGeom prst="rect">
+            <a:avLst/>
+          </a:prstGeom>
+        </p:spPr>
+      </p:pic>
     </p:spTree>
     <p:extLst>
       <p:ext uri="{BB962C8B-B14F-4D97-AF65-F5344CB8AC3E}">
@@ -28945,6 +28954,141 @@
   <p:clrMapOvr>
     <a:masterClrMapping/>
   </p:clrMapOvr>
+  <p:timing>
+    <p:tnLst>
+      <p:par>
+        <p:cTn id="1" dur="indefinite" restart="never" nodeType="tmRoot">
+          <p:childTnLst>
+            <p:seq concurrent="1" nextAc="seek">
+              <p:cTn id="2" dur="indefinite" nodeType="mainSeq">
+                <p:childTnLst>
+                  <p:par>
+                    <p:cTn id="3" fill="hold">
+                      <p:stCondLst>
+                        <p:cond delay="indefinite"/>
+                      </p:stCondLst>
+                      <p:childTnLst>
+                        <p:par>
+                          <p:cTn id="4" fill="hold">
+                            <p:stCondLst>
+                              <p:cond delay="0"/>
+                            </p:stCondLst>
+                            <p:childTnLst>
+                              <p:par>
+                                <p:cTn id="5" presetID="1" presetClass="mediacall" presetSubtype="0" fill="hold" nodeType="clickEffect">
+                                  <p:stCondLst>
+                                    <p:cond delay="0"/>
+                                  </p:stCondLst>
+                                  <p:childTnLst>
+                                    <p:cmd type="call" cmd="playFrom(0.0)">
+                                      <p:cBhvr>
+                                        <p:cTn id="6" dur="1" fill="hold"/>
+                                        <p:tgtEl>
+                                          <p:spTgt spid="4"/>
+                                        </p:tgtEl>
+                                      </p:cBhvr>
+                                    </p:cmd>
+                                  </p:childTnLst>
+                                </p:cTn>
+                              </p:par>
+                            </p:childTnLst>
+                          </p:cTn>
+                        </p:par>
+                      </p:childTnLst>
+                    </p:cTn>
+                  </p:par>
+                </p:childTnLst>
+              </p:cTn>
+              <p:prevCondLst>
+                <p:cond evt="onPrev" delay="0">
+                  <p:tgtEl>
+                    <p:sldTgt/>
+                  </p:tgtEl>
+                </p:cond>
+              </p:prevCondLst>
+              <p:nextCondLst>
+                <p:cond evt="onNext" delay="0">
+                  <p:tgtEl>
+                    <p:sldTgt/>
+                  </p:tgtEl>
+                </p:cond>
+              </p:nextCondLst>
+            </p:seq>
+            <p:video>
+              <p:cMediaNode vol="80000">
+                <p:cTn id="7" fill="hold" display="0">
+                  <p:stCondLst>
+                    <p:cond delay="indefinite"/>
+                  </p:stCondLst>
+                </p:cTn>
+                <p:tgtEl>
+                  <p:spTgt spid="4"/>
+                </p:tgtEl>
+              </p:cMediaNode>
+            </p:video>
+            <p:seq concurrent="1" nextAc="seek">
+              <p:cTn id="8" restart="whenNotActive" fill="hold" evtFilter="cancelBubble" nodeType="interactiveSeq">
+                <p:stCondLst>
+                  <p:cond evt="onClick" delay="0">
+                    <p:tgtEl>
+                      <p:spTgt spid="4"/>
+                    </p:tgtEl>
+                  </p:cond>
+                </p:stCondLst>
+                <p:endSync evt="end" delay="0">
+                  <p:rtn val="all"/>
+                </p:endSync>
+                <p:childTnLst>
+                  <p:par>
+                    <p:cTn id="9" fill="hold">
+                      <p:stCondLst>
+                        <p:cond delay="0"/>
+                      </p:stCondLst>
+                      <p:childTnLst>
+                        <p:par>
+                          <p:cTn id="10" fill="hold">
+                            <p:stCondLst>
+                              <p:cond delay="0"/>
+                            </p:stCondLst>
+                            <p:childTnLst>
+                              <p:par>
+                                <p:cTn id="11" presetID="2" presetClass="mediacall" presetSubtype="0" fill="hold" nodeType="clickEffect">
+                                  <p:stCondLst>
+                                    <p:cond delay="0"/>
+                                  </p:stCondLst>
+                                  <p:childTnLst>
+                                    <p:cmd type="call" cmd="togglePause">
+                                      <p:cBhvr>
+                                        <p:cTn id="12" dur="1" fill="hold"/>
+                                        <p:tgtEl>
+                                          <p:spTgt spid="4"/>
+                                        </p:tgtEl>
+                                      </p:cBhvr>
+                                    </p:cmd>
+                                  </p:childTnLst>
+                                </p:cTn>
+                              </p:par>
+                            </p:childTnLst>
+                          </p:cTn>
+                        </p:par>
+                      </p:childTnLst>
+                    </p:cTn>
+                  </p:par>
+                </p:childTnLst>
+              </p:cTn>
+              <p:nextCondLst>
+                <p:cond evt="onClick" delay="0">
+                  <p:tgtEl>
+                    <p:spTgt spid="4"/>
+                  </p:tgtEl>
+                </p:cond>
+              </p:nextCondLst>
+            </p:seq>
+          </p:childTnLst>
+        </p:cTn>
+      </p:par>
+    </p:tnLst>
+  </p:timing>
 </p:sld>
 </file>
 

</xml_diff>